<commit_message>
adicionadas paginas de alteração de email e mudança de pass
Ficam a faltar fazer as paginas 9, 10, 11, 12, 13 e 14 do PowerPoint
</commit_message>
<xml_diff>
--- a/SIE_mockups.pptx
+++ b/SIE_mockups.pptx
@@ -8,11 +8,11 @@
     <p:sldId id="256" r:id="rId2"/>
     <p:sldId id="269" r:id="rId3"/>
     <p:sldId id="257" r:id="rId4"/>
-    <p:sldId id="260" r:id="rId5"/>
-    <p:sldId id="261" r:id="rId6"/>
-    <p:sldId id="263" r:id="rId7"/>
-    <p:sldId id="262" r:id="rId8"/>
-    <p:sldId id="258" r:id="rId9"/>
+    <p:sldId id="258" r:id="rId5"/>
+    <p:sldId id="260" r:id="rId6"/>
+    <p:sldId id="261" r:id="rId7"/>
+    <p:sldId id="263" r:id="rId8"/>
+    <p:sldId id="262" r:id="rId9"/>
     <p:sldId id="259" r:id="rId10"/>
     <p:sldId id="266" r:id="rId11"/>
     <p:sldId id="265" r:id="rId12"/>
@@ -128,7 +128,7 @@
 <file path=ppt/revisionInfo.xml><?xml version="1.0" encoding="utf-8"?>
 <p1510:revInfo xmlns:a="http://schemas.openxmlformats.org/drawingml/2006/main" xmlns:r="http://schemas.openxmlformats.org/officeDocument/2006/relationships" xmlns:p1510="http://schemas.microsoft.com/office/powerpoint/2015/10/main">
   <p1510:revLst>
-    <p1510:client id="{C3DFBA2C-0EB0-922D-BA91-67E470F1D73E}" v="394" dt="2025-11-10T11:26:51.125"/>
+    <p1510:client id="{6C7F1163-5F63-11B6-8390-0D6F219B05EE}" v="64" dt="2025-11-12T18:06:05.327"/>
     <p1510:client id="{CB21DA63-8453-8F06-287E-A0B6CCE3EFA8}" v="425" dt="2025-11-10T18:14:34.405"/>
   </p1510:revLst>
 </p1510:revInfo>
@@ -149,14 +149,6 @@
           <pc:docMk/>
           <pc:sldMk cId="988977761" sldId="256"/>
         </pc:sldMkLst>
-        <pc:spChg chg="del">
-          <ac:chgData name="Diogo da Silva Guedes Tavares" userId="S::up201706336@up.pt::0082672e-caf2-4cb6-be9b-91bd92c527f4" providerId="AD" clId="Web-{C3DFBA2C-0EB0-922D-BA91-67E470F1D73E}" dt="2025-11-10T11:15:56.410" v="73"/>
-          <ac:spMkLst>
-            <pc:docMk/>
-            <pc:sldMk cId="988977761" sldId="256"/>
-            <ac:spMk id="2" creationId="{4F61DE93-D7EE-B4BB-00FC-43E2EF97DE5B}"/>
-          </ac:spMkLst>
-        </pc:spChg>
         <pc:spChg chg="add mod">
           <ac:chgData name="Diogo da Silva Guedes Tavares" userId="S::up201706336@up.pt::0082672e-caf2-4cb6-be9b-91bd92c527f4" providerId="AD" clId="Web-{C3DFBA2C-0EB0-922D-BA91-67E470F1D73E}" dt="2025-11-10T11:17:12.588" v="128" actId="1076"/>
           <ac:spMkLst>
@@ -181,22 +173,6 @@
             <ac:spMk id="6" creationId="{73394B3C-6BB1-BF62-3C32-339E30EB303A}"/>
           </ac:spMkLst>
         </pc:spChg>
-        <pc:spChg chg="add del">
-          <ac:chgData name="Diogo da Silva Guedes Tavares" userId="S::up201706336@up.pt::0082672e-caf2-4cb6-be9b-91bd92c527f4" providerId="AD" clId="Web-{C3DFBA2C-0EB0-922D-BA91-67E470F1D73E}" dt="2025-11-10T11:11:56.907" v="5"/>
-          <ac:spMkLst>
-            <pc:docMk/>
-            <pc:sldMk cId="988977761" sldId="256"/>
-            <ac:spMk id="7" creationId="{5F96B4FB-7F93-7036-6B39-D799303C31EB}"/>
-          </ac:spMkLst>
-        </pc:spChg>
-        <pc:spChg chg="del mod">
-          <ac:chgData name="Diogo da Silva Guedes Tavares" userId="S::up201706336@up.pt::0082672e-caf2-4cb6-be9b-91bd92c527f4" providerId="AD" clId="Web-{C3DFBA2C-0EB0-922D-BA91-67E470F1D73E}" dt="2025-11-10T11:14:12.017" v="38"/>
-          <ac:spMkLst>
-            <pc:docMk/>
-            <pc:sldMk cId="988977761" sldId="256"/>
-            <ac:spMk id="8" creationId="{E2F7B492-E8BA-1685-BFC4-7A5E2835CA79}"/>
-          </ac:spMkLst>
-        </pc:spChg>
         <pc:spChg chg="add mod">
           <ac:chgData name="Diogo da Silva Guedes Tavares" userId="S::up201706336@up.pt::0082672e-caf2-4cb6-be9b-91bd92c527f4" providerId="AD" clId="Web-{C3DFBA2C-0EB0-922D-BA91-67E470F1D73E}" dt="2025-11-10T11:16:29.694" v="81" actId="1076"/>
           <ac:spMkLst>
@@ -211,14 +187,6 @@
             <pc:docMk/>
             <pc:sldMk cId="988977761" sldId="256"/>
             <ac:spMk id="10" creationId="{80A7370E-020D-E32F-ABD8-B5D9B546BB93}"/>
-          </ac:spMkLst>
-        </pc:spChg>
-        <pc:spChg chg="del">
-          <ac:chgData name="Diogo da Silva Guedes Tavares" userId="S::up201706336@up.pt::0082672e-caf2-4cb6-be9b-91bd92c527f4" providerId="AD" clId="Web-{C3DFBA2C-0EB0-922D-BA91-67E470F1D73E}" dt="2025-11-10T11:11:40.951" v="2"/>
-          <ac:spMkLst>
-            <pc:docMk/>
-            <pc:sldMk cId="988977761" sldId="256"/>
-            <ac:spMk id="11" creationId="{E3FBD514-2A22-267C-C5C8-5D35B3684C68}"/>
           </ac:spMkLst>
         </pc:spChg>
         <pc:spChg chg="add mod">
@@ -315,13 +283,6 @@
           </ac:spMkLst>
         </pc:spChg>
       </pc:sldChg>
-      <pc:sldChg chg="new del">
-        <pc:chgData name="Diogo da Silva Guedes Tavares" userId="S::up201706336@up.pt::0082672e-caf2-4cb6-be9b-91bd92c527f4" providerId="AD" clId="Web-{C3DFBA2C-0EB0-922D-BA91-67E470F1D73E}" dt="2025-11-10T11:14:29.346" v="41"/>
-        <pc:sldMkLst>
-          <pc:docMk/>
-          <pc:sldMk cId="3313345083" sldId="266"/>
-        </pc:sldMkLst>
-      </pc:sldChg>
     </pc:docChg>
   </pc:docChgLst>
   <pc:docChgLst>
@@ -406,14 +367,6 @@
           <pc:docMk/>
           <pc:sldMk cId="2752986164" sldId="266"/>
         </pc:sldMkLst>
-        <pc:spChg chg="del">
-          <ac:chgData name="Diogo da Silva Guedes Tavares" userId="S::up201706336@up.pt::0082672e-caf2-4cb6-be9b-91bd92c527f4" providerId="AD" clId="Web-{CB21DA63-8453-8F06-287E-A0B6CCE3EFA8}" dt="2025-11-10T17:58:38.167" v="68"/>
-          <ac:spMkLst>
-            <pc:docMk/>
-            <pc:sldMk cId="2752986164" sldId="266"/>
-            <ac:spMk id="3" creationId="{13557E0F-35D9-ED35-CBDF-DF03E822A8ED}"/>
-          </ac:spMkLst>
-        </pc:spChg>
         <pc:spChg chg="mod">
           <ac:chgData name="Diogo da Silva Guedes Tavares" userId="S::up201706336@up.pt::0082672e-caf2-4cb6-be9b-91bd92c527f4" providerId="AD" clId="Web-{CB21DA63-8453-8F06-287E-A0B6CCE3EFA8}" dt="2025-11-10T17:56:18.212" v="1" actId="20577"/>
           <ac:spMkLst>
@@ -428,14 +381,6 @@
             <pc:docMk/>
             <pc:sldMk cId="2752986164" sldId="266"/>
             <ac:spMk id="8" creationId="{6480F665-AABD-0E46-5A16-B06077B323C8}"/>
-          </ac:spMkLst>
-        </pc:spChg>
-        <pc:spChg chg="del">
-          <ac:chgData name="Diogo da Silva Guedes Tavares" userId="S::up201706336@up.pt::0082672e-caf2-4cb6-be9b-91bd92c527f4" providerId="AD" clId="Web-{CB21DA63-8453-8F06-287E-A0B6CCE3EFA8}" dt="2025-11-10T17:58:35.135" v="67"/>
-          <ac:spMkLst>
-            <pc:docMk/>
-            <pc:sldMk cId="2752986164" sldId="266"/>
-            <ac:spMk id="9" creationId="{34F01C35-851B-D482-8BE8-B35FA3E26A0B}"/>
           </ac:spMkLst>
         </pc:spChg>
         <pc:spChg chg="mod">
@@ -476,14 +421,6 @@
             <pc:docMk/>
             <pc:sldMk cId="2752986164" sldId="266"/>
             <ac:spMk id="15" creationId="{F543D9BB-A50D-7936-73A2-D80AE0F2EF51}"/>
-          </ac:spMkLst>
-        </pc:spChg>
-        <pc:spChg chg="add del mod">
-          <ac:chgData name="Diogo da Silva Guedes Tavares" userId="S::up201706336@up.pt::0082672e-caf2-4cb6-be9b-91bd92c527f4" providerId="AD" clId="Web-{CB21DA63-8453-8F06-287E-A0B6CCE3EFA8}" dt="2025-11-10T17:58:21.604" v="61"/>
-          <ac:spMkLst>
-            <pc:docMk/>
-            <pc:sldMk cId="2752986164" sldId="266"/>
-            <ac:spMk id="16" creationId="{8D00FD04-6FFC-C039-DFA2-503B0BAA4AFB}"/>
           </ac:spMkLst>
         </pc:spChg>
       </pc:sldChg>
@@ -675,12 +612,59 @@
             <ac:spMk id="10" creationId="{1950D19B-7161-F155-D929-908DB82F3B1C}"/>
           </ac:spMkLst>
         </pc:spChg>
-        <pc:spChg chg="del">
-          <ac:chgData name="Diogo da Silva Guedes Tavares" userId="S::up201706336@up.pt::0082672e-caf2-4cb6-be9b-91bd92c527f4" providerId="AD" clId="Web-{CB21DA63-8453-8F06-287E-A0B6CCE3EFA8}" dt="2025-11-10T18:06:15.904" v="188"/>
+      </pc:sldChg>
+    </pc:docChg>
+  </pc:docChgLst>
+  <pc:docChgLst>
+    <pc:chgData name="Diogo da Silva Guedes Tavares" userId="S::up201706336@up.pt::0082672e-caf2-4cb6-be9b-91bd92c527f4" providerId="AD" clId="Web-{6C7F1163-5F63-11B6-8390-0D6F219B05EE}"/>
+    <pc:docChg chg="modSld sldOrd">
+      <pc:chgData name="Diogo da Silva Guedes Tavares" userId="S::up201706336@up.pt::0082672e-caf2-4cb6-be9b-91bd92c527f4" providerId="AD" clId="Web-{6C7F1163-5F63-11B6-8390-0D6F219B05EE}" dt="2025-11-12T18:06:02.264" v="30" actId="20577"/>
+      <pc:docMkLst>
+        <pc:docMk/>
+      </pc:docMkLst>
+      <pc:sldChg chg="ord">
+        <pc:chgData name="Diogo da Silva Guedes Tavares" userId="S::up201706336@up.pt::0082672e-caf2-4cb6-be9b-91bd92c527f4" providerId="AD" clId="Web-{6C7F1163-5F63-11B6-8390-0D6F219B05EE}" dt="2025-11-12T15:29:53.026" v="0"/>
+        <pc:sldMkLst>
+          <pc:docMk/>
+          <pc:sldMk cId="2010659919" sldId="258"/>
+        </pc:sldMkLst>
+      </pc:sldChg>
+      <pc:sldChg chg="addSp modSp">
+        <pc:chgData name="Diogo da Silva Guedes Tavares" userId="S::up201706336@up.pt::0082672e-caf2-4cb6-be9b-91bd92c527f4" providerId="AD" clId="Web-{6C7F1163-5F63-11B6-8390-0D6F219B05EE}" dt="2025-11-12T18:06:02.264" v="30" actId="20577"/>
+        <pc:sldMkLst>
+          <pc:docMk/>
+          <pc:sldMk cId="2332653092" sldId="263"/>
+        </pc:sldMkLst>
+        <pc:spChg chg="add mod">
+          <ac:chgData name="Diogo da Silva Guedes Tavares" userId="S::up201706336@up.pt::0082672e-caf2-4cb6-be9b-91bd92c527f4" providerId="AD" clId="Web-{6C7F1163-5F63-11B6-8390-0D6F219B05EE}" dt="2025-11-12T18:05:36.731" v="16" actId="20577"/>
           <ac:spMkLst>
             <pc:docMk/>
-            <pc:sldMk cId="1373032526" sldId="269"/>
-            <ac:spMk id="14" creationId="{E24CEDE5-3D1B-5482-3F2C-FD0B2EE152D9}"/>
+            <pc:sldMk cId="2332653092" sldId="263"/>
+            <ac:spMk id="3" creationId="{7C7132DD-F921-A6C1-7A8B-4A578598DC32}"/>
+          </ac:spMkLst>
+        </pc:spChg>
+        <pc:spChg chg="add mod">
+          <ac:chgData name="Diogo da Silva Guedes Tavares" userId="S::up201706336@up.pt::0082672e-caf2-4cb6-be9b-91bd92c527f4" providerId="AD" clId="Web-{6C7F1163-5F63-11B6-8390-0D6F219B05EE}" dt="2025-11-12T18:05:54.451" v="22" actId="20577"/>
+          <ac:spMkLst>
+            <pc:docMk/>
+            <pc:sldMk cId="2332653092" sldId="263"/>
+            <ac:spMk id="8" creationId="{13890C7E-5E0F-A3C1-6D27-899955C86E56}"/>
+          </ac:spMkLst>
+        </pc:spChg>
+        <pc:spChg chg="mod">
+          <ac:chgData name="Diogo da Silva Guedes Tavares" userId="S::up201706336@up.pt::0082672e-caf2-4cb6-be9b-91bd92c527f4" providerId="AD" clId="Web-{6C7F1163-5F63-11B6-8390-0D6F219B05EE}" dt="2025-11-12T18:05:30.231" v="13" actId="20577"/>
+          <ac:spMkLst>
+            <pc:docMk/>
+            <pc:sldMk cId="2332653092" sldId="263"/>
+            <ac:spMk id="10" creationId="{AA46A4DE-2D45-A258-489B-BB42C0ACED7C}"/>
+          </ac:spMkLst>
+        </pc:spChg>
+        <pc:spChg chg="mod">
+          <ac:chgData name="Diogo da Silva Guedes Tavares" userId="S::up201706336@up.pt::0082672e-caf2-4cb6-be9b-91bd92c527f4" providerId="AD" clId="Web-{6C7F1163-5F63-11B6-8390-0D6F219B05EE}" dt="2025-11-12T18:06:02.264" v="30" actId="20577"/>
+          <ac:spMkLst>
+            <pc:docMk/>
+            <pc:sldMk cId="2332653092" sldId="263"/>
+            <ac:spMk id="16" creationId="{014011CE-A87A-F3EB-B2DD-A9445131FEFE}"/>
           </ac:spMkLst>
         </pc:spChg>
       </pc:sldChg>
@@ -818,7 +802,7 @@
           <a:p>
             <a:fld id="{E431C0BB-DC71-4713-A787-95011EDB8CA8}" type="datetimeFigureOut">
               <a:rPr lang="pt-PT" smtClean="0"/>
-              <a:t>10/11/2025</a:t>
+              <a:t>12/11/2025</a:t>
             </a:fld>
             <a:endParaRPr lang="pt-PT"/>
           </a:p>
@@ -986,7 +970,7 @@
           <a:p>
             <a:fld id="{E431C0BB-DC71-4713-A787-95011EDB8CA8}" type="datetimeFigureOut">
               <a:rPr lang="pt-PT" smtClean="0"/>
-              <a:t>10/11/2025</a:t>
+              <a:t>12/11/2025</a:t>
             </a:fld>
             <a:endParaRPr lang="pt-PT"/>
           </a:p>
@@ -1164,7 +1148,7 @@
           <a:p>
             <a:fld id="{E431C0BB-DC71-4713-A787-95011EDB8CA8}" type="datetimeFigureOut">
               <a:rPr lang="pt-PT" smtClean="0"/>
-              <a:t>10/11/2025</a:t>
+              <a:t>12/11/2025</a:t>
             </a:fld>
             <a:endParaRPr lang="pt-PT"/>
           </a:p>
@@ -1332,7 +1316,7 @@
           <a:p>
             <a:fld id="{E431C0BB-DC71-4713-A787-95011EDB8CA8}" type="datetimeFigureOut">
               <a:rPr lang="pt-PT" smtClean="0"/>
-              <a:t>10/11/2025</a:t>
+              <a:t>12/11/2025</a:t>
             </a:fld>
             <a:endParaRPr lang="pt-PT"/>
           </a:p>
@@ -1577,7 +1561,7 @@
           <a:p>
             <a:fld id="{E431C0BB-DC71-4713-A787-95011EDB8CA8}" type="datetimeFigureOut">
               <a:rPr lang="pt-PT" smtClean="0"/>
-              <a:t>10/11/2025</a:t>
+              <a:t>12/11/2025</a:t>
             </a:fld>
             <a:endParaRPr lang="pt-PT"/>
           </a:p>
@@ -1806,7 +1790,7 @@
           <a:p>
             <a:fld id="{E431C0BB-DC71-4713-A787-95011EDB8CA8}" type="datetimeFigureOut">
               <a:rPr lang="pt-PT" smtClean="0"/>
-              <a:t>10/11/2025</a:t>
+              <a:t>12/11/2025</a:t>
             </a:fld>
             <a:endParaRPr lang="pt-PT"/>
           </a:p>
@@ -2170,7 +2154,7 @@
           <a:p>
             <a:fld id="{E431C0BB-DC71-4713-A787-95011EDB8CA8}" type="datetimeFigureOut">
               <a:rPr lang="pt-PT" smtClean="0"/>
-              <a:t>10/11/2025</a:t>
+              <a:t>12/11/2025</a:t>
             </a:fld>
             <a:endParaRPr lang="pt-PT"/>
           </a:p>
@@ -2287,7 +2271,7 @@
           <a:p>
             <a:fld id="{E431C0BB-DC71-4713-A787-95011EDB8CA8}" type="datetimeFigureOut">
               <a:rPr lang="pt-PT" smtClean="0"/>
-              <a:t>10/11/2025</a:t>
+              <a:t>12/11/2025</a:t>
             </a:fld>
             <a:endParaRPr lang="pt-PT"/>
           </a:p>
@@ -2382,7 +2366,7 @@
           <a:p>
             <a:fld id="{E431C0BB-DC71-4713-A787-95011EDB8CA8}" type="datetimeFigureOut">
               <a:rPr lang="pt-PT" smtClean="0"/>
-              <a:t>10/11/2025</a:t>
+              <a:t>12/11/2025</a:t>
             </a:fld>
             <a:endParaRPr lang="pt-PT"/>
           </a:p>
@@ -2657,7 +2641,7 @@
           <a:p>
             <a:fld id="{E431C0BB-DC71-4713-A787-95011EDB8CA8}" type="datetimeFigureOut">
               <a:rPr lang="pt-PT" smtClean="0"/>
-              <a:t>10/11/2025</a:t>
+              <a:t>12/11/2025</a:t>
             </a:fld>
             <a:endParaRPr lang="pt-PT"/>
           </a:p>
@@ -2909,7 +2893,7 @@
           <a:p>
             <a:fld id="{E431C0BB-DC71-4713-A787-95011EDB8CA8}" type="datetimeFigureOut">
               <a:rPr lang="pt-PT" smtClean="0"/>
-              <a:t>10/11/2025</a:t>
+              <a:t>12/11/2025</a:t>
             </a:fld>
             <a:endParaRPr lang="pt-PT"/>
           </a:p>
@@ -3120,7 +3104,7 @@
           <a:p>
             <a:fld id="{E431C0BB-DC71-4713-A787-95011EDB8CA8}" type="datetimeFigureOut">
               <a:rPr lang="pt-PT" smtClean="0"/>
-              <a:t>10/11/2025</a:t>
+              <a:t>12/11/2025</a:t>
             </a:fld>
             <a:endParaRPr lang="pt-PT"/>
           </a:p>
@@ -8247,6 +8231,460 @@
         <p:cNvPr id="1" name="">
           <a:extLst>
             <a:ext uri="{FF2B5EF4-FFF2-40B4-BE49-F238E27FC236}">
+              <a16:creationId xmlns:a16="http://schemas.microsoft.com/office/drawing/2014/main" id="{DC151DDD-2BEE-99FA-FE0E-B1F566E12701}"/>
+            </a:ext>
+          </a:extLst>
+        </p:cNvPr>
+        <p:cNvGrpSpPr/>
+        <p:nvPr/>
+      </p:nvGrpSpPr>
+      <p:grpSpPr>
+        <a:xfrm>
+          <a:off x="0" y="0"/>
+          <a:ext cx="0" cy="0"/>
+          <a:chOff x="0" y="0"/>
+          <a:chExt cx="0" cy="0"/>
+        </a:xfrm>
+      </p:grpSpPr>
+      <p:sp>
+        <p:nvSpPr>
+          <p:cNvPr id="2" name="CaixaDeTexto 1">
+            <a:extLst>
+              <a:ext uri="{FF2B5EF4-FFF2-40B4-BE49-F238E27FC236}">
+                <a16:creationId xmlns:a16="http://schemas.microsoft.com/office/drawing/2014/main" id="{E802E166-17DE-1148-6E08-8874B557EAFE}"/>
+              </a:ext>
+            </a:extLst>
+          </p:cNvPr>
+          <p:cNvSpPr txBox="1"/>
+          <p:nvPr/>
+        </p:nvSpPr>
+        <p:spPr>
+          <a:xfrm>
+            <a:off x="0" y="13418"/>
+            <a:ext cx="12170530" cy="1784653"/>
+          </a:xfrm>
+          <a:prstGeom prst="rect">
+            <a:avLst/>
+          </a:prstGeom>
+          <a:noFill/>
+        </p:spPr>
+        <p:txBody>
+          <a:bodyPr rot="0" spcFirstLastPara="0" vertOverflow="overflow" horzOverflow="overflow" vert="horz" wrap="square" lIns="91440" tIns="45720" rIns="91440" bIns="45720" numCol="1" spcCol="0" rtlCol="0" fromWordArt="0" anchor="t" anchorCtr="0" forceAA="0" compatLnSpc="1">
+            <a:prstTxWarp prst="textNoShape">
+              <a:avLst/>
+            </a:prstTxWarp>
+            <a:spAutoFit/>
+          </a:bodyPr>
+          <a:lstStyle/>
+          <a:p>
+            <a:pPr algn="l"/>
+            <a:endParaRPr lang="pt-PT"/>
+          </a:p>
+        </p:txBody>
+      </p:sp>
+      <p:sp>
+        <p:nvSpPr>
+          <p:cNvPr id="4" name="CaixaDeTexto 3">
+            <a:extLst>
+              <a:ext uri="{FF2B5EF4-FFF2-40B4-BE49-F238E27FC236}">
+                <a16:creationId xmlns:a16="http://schemas.microsoft.com/office/drawing/2014/main" id="{AE2D646B-65C4-71AF-D909-7F8C9BBCDEA6}"/>
+              </a:ext>
+            </a:extLst>
+          </p:cNvPr>
+          <p:cNvSpPr txBox="1"/>
+          <p:nvPr/>
+        </p:nvSpPr>
+        <p:spPr>
+          <a:xfrm>
+            <a:off x="1392115" y="1143000"/>
+            <a:ext cx="3839307" cy="1055076"/>
+          </a:xfrm>
+          <a:prstGeom prst="rect">
+            <a:avLst/>
+          </a:prstGeom>
+          <a:noFill/>
+        </p:spPr>
+        <p:txBody>
+          <a:bodyPr rot="0" spcFirstLastPara="0" vertOverflow="overflow" horzOverflow="overflow" vert="horz" wrap="square" lIns="91440" tIns="45720" rIns="91440" bIns="45720" numCol="1" spcCol="0" rtlCol="0" fromWordArt="0" anchor="t" anchorCtr="0" forceAA="0" compatLnSpc="1">
+            <a:prstTxWarp prst="textNoShape">
+              <a:avLst/>
+            </a:prstTxWarp>
+            <a:spAutoFit/>
+          </a:bodyPr>
+          <a:lstStyle/>
+          <a:p>
+            <a:pPr algn="l"/>
+            <a:endParaRPr lang="pt-PT"/>
+          </a:p>
+        </p:txBody>
+      </p:sp>
+      <p:sp>
+        <p:nvSpPr>
+          <p:cNvPr id="6" name="CaixaDeTexto 5">
+            <a:extLst>
+              <a:ext uri="{FF2B5EF4-FFF2-40B4-BE49-F238E27FC236}">
+                <a16:creationId xmlns:a16="http://schemas.microsoft.com/office/drawing/2014/main" id="{DD0450DB-CE43-CDD6-F05D-DB54B187B990}"/>
+              </a:ext>
+            </a:extLst>
+          </p:cNvPr>
+          <p:cNvSpPr txBox="1"/>
+          <p:nvPr/>
+        </p:nvSpPr>
+        <p:spPr>
+          <a:xfrm>
+            <a:off x="-5861" y="14653"/>
+            <a:ext cx="12171483" cy="1107996"/>
+          </a:xfrm>
+          <a:prstGeom prst="rect">
+            <a:avLst/>
+          </a:prstGeom>
+        </p:spPr>
+        <p:style>
+          <a:lnRef idx="2">
+            <a:schemeClr val="dk1"/>
+          </a:lnRef>
+          <a:fillRef idx="1">
+            <a:schemeClr val="lt1"/>
+          </a:fillRef>
+          <a:effectRef idx="0">
+            <a:schemeClr val="dk1"/>
+          </a:effectRef>
+          <a:fontRef idx="minor">
+            <a:schemeClr val="dk1"/>
+          </a:fontRef>
+        </p:style>
+        <p:txBody>
+          <a:bodyPr rot="0" spcFirstLastPara="0" vertOverflow="overflow" horzOverflow="overflow" vert="horz" wrap="square" lIns="91440" tIns="45720" rIns="91440" bIns="45720" numCol="1" spcCol="0" rtlCol="0" fromWordArt="0" anchor="t" anchorCtr="0" forceAA="0" compatLnSpc="1">
+            <a:prstTxWarp prst="textNoShape">
+              <a:avLst/>
+            </a:prstTxWarp>
+            <a:spAutoFit/>
+          </a:bodyPr>
+          <a:lstStyle/>
+          <a:p>
+            <a:endParaRPr lang="pt-PT" sz="2400" dirty="0"/>
+          </a:p>
+          <a:p>
+            <a:r>
+              <a:rPr lang="pt-PT" sz="2400" dirty="0"/>
+              <a:t>   LOGO   BARRA DE PESQUISA   PERFIL/INICIAR SESSAO/REGISTAR</a:t>
+            </a:r>
+            <a:endParaRPr lang="pt-PT" dirty="0"/>
+          </a:p>
+          <a:p>
+            <a:endParaRPr lang="pt-PT" dirty="0"/>
+          </a:p>
+        </p:txBody>
+      </p:sp>
+      <p:sp>
+        <p:nvSpPr>
+          <p:cNvPr id="7" name="CaixaDeTexto 6">
+            <a:extLst>
+              <a:ext uri="{FF2B5EF4-FFF2-40B4-BE49-F238E27FC236}">
+                <a16:creationId xmlns:a16="http://schemas.microsoft.com/office/drawing/2014/main" id="{05F25C75-3705-BDBC-38C3-6EFE96DC112C}"/>
+              </a:ext>
+            </a:extLst>
+          </p:cNvPr>
+          <p:cNvSpPr txBox="1"/>
+          <p:nvPr/>
+        </p:nvSpPr>
+        <p:spPr>
+          <a:xfrm>
+            <a:off x="674076" y="1530699"/>
+            <a:ext cx="5275384" cy="369332"/>
+          </a:xfrm>
+          <a:prstGeom prst="rect">
+            <a:avLst/>
+          </a:prstGeom>
+          <a:noFill/>
+        </p:spPr>
+        <p:txBody>
+          <a:bodyPr rot="0" spcFirstLastPara="0" vertOverflow="overflow" horzOverflow="overflow" vert="horz" wrap="square" lIns="91440" tIns="45720" rIns="91440" bIns="45720" numCol="1" spcCol="0" rtlCol="0" fromWordArt="0" anchor="t" anchorCtr="0" forceAA="0" compatLnSpc="1">
+            <a:prstTxWarp prst="textNoShape">
+              <a:avLst/>
+            </a:prstTxWarp>
+            <a:spAutoFit/>
+          </a:bodyPr>
+          <a:lstStyle/>
+          <a:p>
+            <a:r>
+              <a:rPr lang="pt-PT" dirty="0"/>
+              <a:t>Desenvolvedores:</a:t>
+            </a:r>
+          </a:p>
+        </p:txBody>
+      </p:sp>
+      <p:sp>
+        <p:nvSpPr>
+          <p:cNvPr id="8" name="CaixaDeTexto 7">
+            <a:extLst>
+              <a:ext uri="{FF2B5EF4-FFF2-40B4-BE49-F238E27FC236}">
+                <a16:creationId xmlns:a16="http://schemas.microsoft.com/office/drawing/2014/main" id="{AE7C3B73-5DAA-7494-72F5-DE452C907435}"/>
+              </a:ext>
+            </a:extLst>
+          </p:cNvPr>
+          <p:cNvSpPr txBox="1"/>
+          <p:nvPr/>
+        </p:nvSpPr>
+        <p:spPr>
+          <a:xfrm>
+            <a:off x="669471" y="2003707"/>
+            <a:ext cx="7819292" cy="5078313"/>
+          </a:xfrm>
+          <a:prstGeom prst="rect">
+            <a:avLst/>
+          </a:prstGeom>
+          <a:noFill/>
+        </p:spPr>
+        <p:txBody>
+          <a:bodyPr rot="0" spcFirstLastPara="0" vertOverflow="overflow" horzOverflow="overflow" vert="horz" wrap="square" lIns="91440" tIns="45720" rIns="91440" bIns="45720" numCol="1" spcCol="0" rtlCol="0" fromWordArt="0" anchor="t" anchorCtr="0" forceAA="0" compatLnSpc="1">
+            <a:prstTxWarp prst="textNoShape">
+              <a:avLst/>
+            </a:prstTxWarp>
+            <a:spAutoFit/>
+          </a:bodyPr>
+          <a:lstStyle/>
+          <a:p>
+            <a:r>
+              <a:rPr lang="pt-PT" dirty="0"/>
+              <a:t> Desenvolvedor 1:</a:t>
+            </a:r>
+          </a:p>
+          <a:p>
+            <a:endParaRPr lang="pt-PT" dirty="0"/>
+          </a:p>
+          <a:p>
+            <a:endParaRPr lang="pt-PT" dirty="0"/>
+          </a:p>
+          <a:p>
+            <a:endParaRPr lang="pt-PT" dirty="0"/>
+          </a:p>
+          <a:p>
+            <a:endParaRPr lang="pt-PT" dirty="0"/>
+          </a:p>
+          <a:p>
+            <a:endParaRPr lang="pt-PT" dirty="0"/>
+          </a:p>
+          <a:p>
+            <a:endParaRPr lang="pt-PT" dirty="0"/>
+          </a:p>
+          <a:p>
+            <a:endParaRPr lang="pt-PT" dirty="0"/>
+          </a:p>
+          <a:p>
+            <a:endParaRPr lang="pt-PT" dirty="0"/>
+          </a:p>
+          <a:p>
+            <a:endParaRPr lang="pt-PT" dirty="0"/>
+          </a:p>
+          <a:p>
+            <a:endParaRPr lang="pt-PT" dirty="0"/>
+          </a:p>
+          <a:p>
+            <a:r>
+              <a:rPr lang="pt-PT" dirty="0"/>
+              <a:t> Desenvolvedor 2:</a:t>
+            </a:r>
+          </a:p>
+          <a:p>
+            <a:endParaRPr lang="pt-PT" dirty="0"/>
+          </a:p>
+          <a:p>
+            <a:r>
+              <a:rPr lang="pt-PT" dirty="0"/>
+              <a:t> Desenvolvedor 3:</a:t>
+            </a:r>
+          </a:p>
+          <a:p>
+            <a:endParaRPr lang="pt-PT" dirty="0"/>
+          </a:p>
+          <a:p>
+            <a:r>
+              <a:rPr lang="pt-PT" dirty="0"/>
+              <a:t> Desenvolvedor 4:</a:t>
+            </a:r>
+          </a:p>
+          <a:p>
+            <a:endParaRPr lang="pt-PT" dirty="0"/>
+          </a:p>
+          <a:p>
+            <a:endParaRPr lang="pt-PT" dirty="0"/>
+          </a:p>
+        </p:txBody>
+      </p:sp>
+      <p:sp>
+        <p:nvSpPr>
+          <p:cNvPr id="5" name="CaixaDeTexto 4">
+            <a:extLst>
+              <a:ext uri="{FF2B5EF4-FFF2-40B4-BE49-F238E27FC236}">
+                <a16:creationId xmlns:a16="http://schemas.microsoft.com/office/drawing/2014/main" id="{AC60F33D-3A98-0DEB-6B67-5FB9A15E86DB}"/>
+              </a:ext>
+            </a:extLst>
+          </p:cNvPr>
+          <p:cNvSpPr txBox="1"/>
+          <p:nvPr/>
+        </p:nvSpPr>
+        <p:spPr>
+          <a:xfrm>
+            <a:off x="-3769" y="6490817"/>
+            <a:ext cx="12181115" cy="369332"/>
+          </a:xfrm>
+          <a:prstGeom prst="rect">
+            <a:avLst/>
+          </a:prstGeom>
+        </p:spPr>
+        <p:style>
+          <a:lnRef idx="2">
+            <a:schemeClr val="dk1"/>
+          </a:lnRef>
+          <a:fillRef idx="1">
+            <a:schemeClr val="lt1"/>
+          </a:fillRef>
+          <a:effectRef idx="0">
+            <a:schemeClr val="dk1"/>
+          </a:effectRef>
+          <a:fontRef idx="minor">
+            <a:schemeClr val="dk1"/>
+          </a:fontRef>
+        </p:style>
+        <p:txBody>
+          <a:bodyPr rot="0" spcFirstLastPara="0" vertOverflow="overflow" horzOverflow="overflow" vert="horz" wrap="square" lIns="91440" tIns="45720" rIns="91440" bIns="45720" numCol="1" spcCol="0" rtlCol="0" fromWordArt="0" anchor="t" anchorCtr="0" forceAA="0" compatLnSpc="1">
+            <a:prstTxWarp prst="textNoShape">
+              <a:avLst/>
+            </a:prstTxWarp>
+            <a:spAutoFit/>
+          </a:bodyPr>
+          <a:lstStyle/>
+          <a:p>
+            <a:pPr algn="ctr"/>
+            <a:r>
+              <a:rPr lang="pt-PT" dirty="0"/>
+              <a:t>Desenvolvedores</a:t>
+            </a:r>
+          </a:p>
+        </p:txBody>
+      </p:sp>
+      <p:pic>
+        <p:nvPicPr>
+          <p:cNvPr id="9" name="Imagem 8" descr="Profile Icon Vector Art, Icons, and Graphics for Free Download">
+            <a:extLst>
+              <a:ext uri="{FF2B5EF4-FFF2-40B4-BE49-F238E27FC236}">
+                <a16:creationId xmlns:a16="http://schemas.microsoft.com/office/drawing/2014/main" id="{F7ACA970-3872-30DF-41D9-477FACDA9BE9}"/>
+              </a:ext>
+            </a:extLst>
+          </p:cNvPr>
+          <p:cNvPicPr>
+            <a:picLocks noChangeAspect="1"/>
+          </p:cNvPicPr>
+          <p:nvPr/>
+        </p:nvPicPr>
+        <p:blipFill>
+          <a:blip r:embed="rId2"/>
+          <a:stretch>
+            <a:fillRect/>
+          </a:stretch>
+        </p:blipFill>
+        <p:spPr>
+          <a:xfrm>
+            <a:off x="1009459" y="2470749"/>
+            <a:ext cx="2231572" cy="2275115"/>
+          </a:xfrm>
+          <a:prstGeom prst="rect">
+            <a:avLst/>
+          </a:prstGeom>
+          <a:ln w="38100" cap="sq">
+            <a:solidFill>
+              <a:srgbClr val="000000"/>
+            </a:solidFill>
+            <a:prstDash val="solid"/>
+            <a:miter lim="800000"/>
+          </a:ln>
+          <a:effectLst>
+            <a:outerShdw blurRad="50800" dist="38100" dir="2700000" algn="tl" rotWithShape="0">
+              <a:srgbClr val="000000">
+                <a:alpha val="43000"/>
+              </a:srgbClr>
+            </a:outerShdw>
+          </a:effectLst>
+        </p:spPr>
+      </p:pic>
+      <p:sp>
+        <p:nvSpPr>
+          <p:cNvPr id="12" name="CaixaDeTexto 11">
+            <a:extLst>
+              <a:ext uri="{FF2B5EF4-FFF2-40B4-BE49-F238E27FC236}">
+                <a16:creationId xmlns:a16="http://schemas.microsoft.com/office/drawing/2014/main" id="{4811ECF1-33E7-F2D6-321E-AE69A2292431}"/>
+              </a:ext>
+            </a:extLst>
+          </p:cNvPr>
+          <p:cNvSpPr txBox="1"/>
+          <p:nvPr/>
+        </p:nvSpPr>
+        <p:spPr>
+          <a:xfrm>
+            <a:off x="4348843" y="2404485"/>
+            <a:ext cx="5870750" cy="1477328"/>
+          </a:xfrm>
+          <a:prstGeom prst="rect">
+            <a:avLst/>
+          </a:prstGeom>
+          <a:noFill/>
+        </p:spPr>
+        <p:txBody>
+          <a:bodyPr rot="0" spcFirstLastPara="0" vertOverflow="overflow" horzOverflow="overflow" vert="horz" wrap="square" lIns="91440" tIns="45720" rIns="91440" bIns="45720" numCol="1" spcCol="0" rtlCol="0" fromWordArt="0" anchor="t" anchorCtr="0" forceAA="0" compatLnSpc="1">
+            <a:prstTxWarp prst="textNoShape">
+              <a:avLst/>
+            </a:prstTxWarp>
+            <a:spAutoFit/>
+          </a:bodyPr>
+          <a:lstStyle/>
+          <a:p>
+            <a:r>
+              <a:rPr lang="pt-PT" dirty="0"/>
+              <a:t>E-mail: email@email.com</a:t>
+            </a:r>
+          </a:p>
+          <a:p>
+            <a:endParaRPr lang="pt-PT" dirty="0"/>
+          </a:p>
+          <a:p>
+            <a:r>
+              <a:rPr lang="pt-PT" dirty="0"/>
+              <a:t>Faculdade: FEUP</a:t>
+            </a:r>
+          </a:p>
+          <a:p>
+            <a:endParaRPr lang="pt-PT" dirty="0"/>
+          </a:p>
+          <a:p>
+            <a:r>
+              <a:rPr lang="pt-PT" dirty="0"/>
+              <a:t>Curso:  MEEC</a:t>
+            </a:r>
+          </a:p>
+        </p:txBody>
+      </p:sp>
+    </p:spTree>
+    <p:extLst>
+      <p:ext uri="{BB962C8B-B14F-4D97-AF65-F5344CB8AC3E}">
+        <p14:creationId xmlns:p14="http://schemas.microsoft.com/office/powerpoint/2010/main" val="2010659919"/>
+      </p:ext>
+    </p:extLst>
+  </p:cSld>
+  <p:clrMapOvr>
+    <a:masterClrMapping/>
+  </p:clrMapOvr>
+</p:sld>
+</file>
+
+<file path=ppt/slides/slide5.xml><?xml version="1.0" encoding="utf-8"?>
+<p:sld xmlns:a="http://schemas.openxmlformats.org/drawingml/2006/main" xmlns:r="http://schemas.openxmlformats.org/officeDocument/2006/relationships" xmlns:p="http://schemas.openxmlformats.org/presentationml/2006/main">
+  <p:cSld>
+    <p:spTree>
+      <p:nvGrpSpPr>
+        <p:cNvPr id="1" name="">
+          <a:extLst>
+            <a:ext uri="{FF2B5EF4-FFF2-40B4-BE49-F238E27FC236}">
               <a16:creationId xmlns:a16="http://schemas.microsoft.com/office/drawing/2014/main" id="{D312FD09-589F-4F45-9197-A0FA7BC7A649}"/>
             </a:ext>
           </a:extLst>
@@ -8812,7 +9250,7 @@
 </p:sld>
 </file>
 
-<file path=ppt/slides/slide5.xml><?xml version="1.0" encoding="utf-8"?>
+<file path=ppt/slides/slide6.xml><?xml version="1.0" encoding="utf-8"?>
 <p:sld xmlns:a="http://schemas.openxmlformats.org/drawingml/2006/main" xmlns:r="http://schemas.openxmlformats.org/officeDocument/2006/relationships" xmlns:p="http://schemas.openxmlformats.org/presentationml/2006/main">
   <p:cSld>
     <p:spTree>
@@ -9410,7 +9848,7 @@
 </p:sld>
 </file>
 
-<file path=ppt/slides/slide6.xml><?xml version="1.0" encoding="utf-8"?>
+<file path=ppt/slides/slide7.xml><?xml version="1.0" encoding="utf-8"?>
 <p:sld xmlns:a="http://schemas.openxmlformats.org/drawingml/2006/main" xmlns:r="http://schemas.openxmlformats.org/officeDocument/2006/relationships" xmlns:p="http://schemas.openxmlformats.org/presentationml/2006/main">
   <p:cSld>
     <p:spTree>
@@ -9738,7 +10176,7 @@
           <a:p>
             <a:r>
               <a:rPr lang="pt-PT" dirty="0"/>
-              <a:t>Novo e-mail:</a:t>
+              <a:t>E-mail antigo:</a:t>
             </a:r>
           </a:p>
         </p:txBody>
@@ -9790,7 +10228,7 @@
             <a:pPr algn="ctr"/>
             <a:r>
               <a:rPr lang="pt-PT" dirty="0"/>
-              <a:t>(inserir novo e-mail)</a:t>
+              <a:t>(inserir e-mail antigo)</a:t>
             </a:r>
           </a:p>
         </p:txBody>
@@ -9895,6 +10333,96 @@
             <a:r>
               <a:rPr lang="pt-PT" dirty="0"/>
               <a:t>Desfazer alterações e voltar atrás</a:t>
+            </a:r>
+          </a:p>
+        </p:txBody>
+      </p:sp>
+      <p:sp>
+        <p:nvSpPr>
+          <p:cNvPr id="3" name="CaixaDeTexto 2">
+            <a:extLst>
+              <a:ext uri="{FF2B5EF4-FFF2-40B4-BE49-F238E27FC236}">
+                <a16:creationId xmlns:a16="http://schemas.microsoft.com/office/drawing/2014/main" id="{7C7132DD-F921-A6C1-7A8B-4A578598DC32}"/>
+              </a:ext>
+            </a:extLst>
+          </p:cNvPr>
+          <p:cNvSpPr txBox="1"/>
+          <p:nvPr/>
+        </p:nvSpPr>
+        <p:spPr>
+          <a:xfrm>
+            <a:off x="2345328" y="3849713"/>
+            <a:ext cx="5870750" cy="369332"/>
+          </a:xfrm>
+          <a:prstGeom prst="rect">
+            <a:avLst/>
+          </a:prstGeom>
+          <a:noFill/>
+        </p:spPr>
+        <p:txBody>
+          <a:bodyPr rot="0" spcFirstLastPara="0" vertOverflow="overflow" horzOverflow="overflow" vert="horz" wrap="square" lIns="91440" tIns="45720" rIns="91440" bIns="45720" numCol="1" spcCol="0" rtlCol="0" fromWordArt="0" anchor="t" anchorCtr="0" forceAA="0" compatLnSpc="1">
+            <a:prstTxWarp prst="textNoShape">
+              <a:avLst/>
+            </a:prstTxWarp>
+            <a:spAutoFit/>
+          </a:bodyPr>
+          <a:lstStyle/>
+          <a:p>
+            <a:r>
+              <a:rPr lang="pt-PT" dirty="0"/>
+              <a:t>E-mail novo:</a:t>
+            </a:r>
+          </a:p>
+        </p:txBody>
+      </p:sp>
+      <p:sp>
+        <p:nvSpPr>
+          <p:cNvPr id="8" name="CaixaDeTexto 7">
+            <a:extLst>
+              <a:ext uri="{FF2B5EF4-FFF2-40B4-BE49-F238E27FC236}">
+                <a16:creationId xmlns:a16="http://schemas.microsoft.com/office/drawing/2014/main" id="{13890C7E-5E0F-A3C1-6D27-899955C86E56}"/>
+              </a:ext>
+            </a:extLst>
+          </p:cNvPr>
+          <p:cNvSpPr txBox="1"/>
+          <p:nvPr/>
+        </p:nvSpPr>
+        <p:spPr>
+          <a:xfrm>
+            <a:off x="5518814" y="3844000"/>
+            <a:ext cx="2882721" cy="369332"/>
+          </a:xfrm>
+          <a:prstGeom prst="rect">
+            <a:avLst/>
+          </a:prstGeom>
+        </p:spPr>
+        <p:style>
+          <a:lnRef idx="2">
+            <a:schemeClr val="dk1"/>
+          </a:lnRef>
+          <a:fillRef idx="1">
+            <a:schemeClr val="lt1"/>
+          </a:fillRef>
+          <a:effectRef idx="0">
+            <a:schemeClr val="dk1"/>
+          </a:effectRef>
+          <a:fontRef idx="minor">
+            <a:schemeClr val="dk1"/>
+          </a:fontRef>
+        </p:style>
+        <p:txBody>
+          <a:bodyPr rot="0" spcFirstLastPara="0" vertOverflow="overflow" horzOverflow="overflow" vert="horz" wrap="square" lIns="91440" tIns="45720" rIns="91440" bIns="45720" numCol="1" spcCol="0" rtlCol="0" fromWordArt="0" anchor="t" anchorCtr="0" forceAA="0" compatLnSpc="1">
+            <a:prstTxWarp prst="textNoShape">
+              <a:avLst/>
+            </a:prstTxWarp>
+            <a:spAutoFit/>
+          </a:bodyPr>
+          <a:lstStyle/>
+          <a:p>
+            <a:pPr algn="ctr"/>
+            <a:r>
+              <a:rPr lang="pt-PT" dirty="0"/>
+              <a:t>(inserir e-mail novo)</a:t>
             </a:r>
           </a:p>
         </p:txBody>
@@ -9912,7 +10440,7 @@
 </p:sld>
 </file>
 
-<file path=ppt/slides/slide7.xml><?xml version="1.0" encoding="utf-8"?>
+<file path=ppt/slides/slide8.xml><?xml version="1.0" encoding="utf-8"?>
 <p:sld xmlns:a="http://schemas.openxmlformats.org/drawingml/2006/main" xmlns:r="http://schemas.openxmlformats.org/officeDocument/2006/relationships" xmlns:p="http://schemas.openxmlformats.org/presentationml/2006/main">
   <p:cSld>
     <p:spTree>
@@ -10495,460 +11023,6 @@
     <p:extLst>
       <p:ext uri="{BB962C8B-B14F-4D97-AF65-F5344CB8AC3E}">
         <p14:creationId xmlns:p14="http://schemas.microsoft.com/office/powerpoint/2010/main" val="2232790266"/>
-      </p:ext>
-    </p:extLst>
-  </p:cSld>
-  <p:clrMapOvr>
-    <a:masterClrMapping/>
-  </p:clrMapOvr>
-</p:sld>
-</file>
-
-<file path=ppt/slides/slide8.xml><?xml version="1.0" encoding="utf-8"?>
-<p:sld xmlns:a="http://schemas.openxmlformats.org/drawingml/2006/main" xmlns:r="http://schemas.openxmlformats.org/officeDocument/2006/relationships" xmlns:p="http://schemas.openxmlformats.org/presentationml/2006/main">
-  <p:cSld>
-    <p:spTree>
-      <p:nvGrpSpPr>
-        <p:cNvPr id="1" name="">
-          <a:extLst>
-            <a:ext uri="{FF2B5EF4-FFF2-40B4-BE49-F238E27FC236}">
-              <a16:creationId xmlns:a16="http://schemas.microsoft.com/office/drawing/2014/main" id="{DC151DDD-2BEE-99FA-FE0E-B1F566E12701}"/>
-            </a:ext>
-          </a:extLst>
-        </p:cNvPr>
-        <p:cNvGrpSpPr/>
-        <p:nvPr/>
-      </p:nvGrpSpPr>
-      <p:grpSpPr>
-        <a:xfrm>
-          <a:off x="0" y="0"/>
-          <a:ext cx="0" cy="0"/>
-          <a:chOff x="0" y="0"/>
-          <a:chExt cx="0" cy="0"/>
-        </a:xfrm>
-      </p:grpSpPr>
-      <p:sp>
-        <p:nvSpPr>
-          <p:cNvPr id="2" name="CaixaDeTexto 1">
-            <a:extLst>
-              <a:ext uri="{FF2B5EF4-FFF2-40B4-BE49-F238E27FC236}">
-                <a16:creationId xmlns:a16="http://schemas.microsoft.com/office/drawing/2014/main" id="{E802E166-17DE-1148-6E08-8874B557EAFE}"/>
-              </a:ext>
-            </a:extLst>
-          </p:cNvPr>
-          <p:cNvSpPr txBox="1"/>
-          <p:nvPr/>
-        </p:nvSpPr>
-        <p:spPr>
-          <a:xfrm>
-            <a:off x="0" y="13418"/>
-            <a:ext cx="12170530" cy="1784653"/>
-          </a:xfrm>
-          <a:prstGeom prst="rect">
-            <a:avLst/>
-          </a:prstGeom>
-          <a:noFill/>
-        </p:spPr>
-        <p:txBody>
-          <a:bodyPr rot="0" spcFirstLastPara="0" vertOverflow="overflow" horzOverflow="overflow" vert="horz" wrap="square" lIns="91440" tIns="45720" rIns="91440" bIns="45720" numCol="1" spcCol="0" rtlCol="0" fromWordArt="0" anchor="t" anchorCtr="0" forceAA="0" compatLnSpc="1">
-            <a:prstTxWarp prst="textNoShape">
-              <a:avLst/>
-            </a:prstTxWarp>
-            <a:spAutoFit/>
-          </a:bodyPr>
-          <a:lstStyle/>
-          <a:p>
-            <a:pPr algn="l"/>
-            <a:endParaRPr lang="pt-PT"/>
-          </a:p>
-        </p:txBody>
-      </p:sp>
-      <p:sp>
-        <p:nvSpPr>
-          <p:cNvPr id="4" name="CaixaDeTexto 3">
-            <a:extLst>
-              <a:ext uri="{FF2B5EF4-FFF2-40B4-BE49-F238E27FC236}">
-                <a16:creationId xmlns:a16="http://schemas.microsoft.com/office/drawing/2014/main" id="{AE2D646B-65C4-71AF-D909-7F8C9BBCDEA6}"/>
-              </a:ext>
-            </a:extLst>
-          </p:cNvPr>
-          <p:cNvSpPr txBox="1"/>
-          <p:nvPr/>
-        </p:nvSpPr>
-        <p:spPr>
-          <a:xfrm>
-            <a:off x="1392115" y="1143000"/>
-            <a:ext cx="3839307" cy="1055076"/>
-          </a:xfrm>
-          <a:prstGeom prst="rect">
-            <a:avLst/>
-          </a:prstGeom>
-          <a:noFill/>
-        </p:spPr>
-        <p:txBody>
-          <a:bodyPr rot="0" spcFirstLastPara="0" vertOverflow="overflow" horzOverflow="overflow" vert="horz" wrap="square" lIns="91440" tIns="45720" rIns="91440" bIns="45720" numCol="1" spcCol="0" rtlCol="0" fromWordArt="0" anchor="t" anchorCtr="0" forceAA="0" compatLnSpc="1">
-            <a:prstTxWarp prst="textNoShape">
-              <a:avLst/>
-            </a:prstTxWarp>
-            <a:spAutoFit/>
-          </a:bodyPr>
-          <a:lstStyle/>
-          <a:p>
-            <a:pPr algn="l"/>
-            <a:endParaRPr lang="pt-PT"/>
-          </a:p>
-        </p:txBody>
-      </p:sp>
-      <p:sp>
-        <p:nvSpPr>
-          <p:cNvPr id="6" name="CaixaDeTexto 5">
-            <a:extLst>
-              <a:ext uri="{FF2B5EF4-FFF2-40B4-BE49-F238E27FC236}">
-                <a16:creationId xmlns:a16="http://schemas.microsoft.com/office/drawing/2014/main" id="{DD0450DB-CE43-CDD6-F05D-DB54B187B990}"/>
-              </a:ext>
-            </a:extLst>
-          </p:cNvPr>
-          <p:cNvSpPr txBox="1"/>
-          <p:nvPr/>
-        </p:nvSpPr>
-        <p:spPr>
-          <a:xfrm>
-            <a:off x="-5861" y="14653"/>
-            <a:ext cx="12171483" cy="1107996"/>
-          </a:xfrm>
-          <a:prstGeom prst="rect">
-            <a:avLst/>
-          </a:prstGeom>
-        </p:spPr>
-        <p:style>
-          <a:lnRef idx="2">
-            <a:schemeClr val="dk1"/>
-          </a:lnRef>
-          <a:fillRef idx="1">
-            <a:schemeClr val="lt1"/>
-          </a:fillRef>
-          <a:effectRef idx="0">
-            <a:schemeClr val="dk1"/>
-          </a:effectRef>
-          <a:fontRef idx="minor">
-            <a:schemeClr val="dk1"/>
-          </a:fontRef>
-        </p:style>
-        <p:txBody>
-          <a:bodyPr rot="0" spcFirstLastPara="0" vertOverflow="overflow" horzOverflow="overflow" vert="horz" wrap="square" lIns="91440" tIns="45720" rIns="91440" bIns="45720" numCol="1" spcCol="0" rtlCol="0" fromWordArt="0" anchor="t" anchorCtr="0" forceAA="0" compatLnSpc="1">
-            <a:prstTxWarp prst="textNoShape">
-              <a:avLst/>
-            </a:prstTxWarp>
-            <a:spAutoFit/>
-          </a:bodyPr>
-          <a:lstStyle/>
-          <a:p>
-            <a:endParaRPr lang="pt-PT" sz="2400" dirty="0"/>
-          </a:p>
-          <a:p>
-            <a:r>
-              <a:rPr lang="pt-PT" sz="2400" dirty="0"/>
-              <a:t>   LOGO   BARRA DE PESQUISA   PERFIL/INICIAR SESSAO/REGISTAR</a:t>
-            </a:r>
-            <a:endParaRPr lang="pt-PT" dirty="0"/>
-          </a:p>
-          <a:p>
-            <a:endParaRPr lang="pt-PT" dirty="0"/>
-          </a:p>
-        </p:txBody>
-      </p:sp>
-      <p:sp>
-        <p:nvSpPr>
-          <p:cNvPr id="7" name="CaixaDeTexto 6">
-            <a:extLst>
-              <a:ext uri="{FF2B5EF4-FFF2-40B4-BE49-F238E27FC236}">
-                <a16:creationId xmlns:a16="http://schemas.microsoft.com/office/drawing/2014/main" id="{05F25C75-3705-BDBC-38C3-6EFE96DC112C}"/>
-              </a:ext>
-            </a:extLst>
-          </p:cNvPr>
-          <p:cNvSpPr txBox="1"/>
-          <p:nvPr/>
-        </p:nvSpPr>
-        <p:spPr>
-          <a:xfrm>
-            <a:off x="674076" y="1530699"/>
-            <a:ext cx="5275384" cy="369332"/>
-          </a:xfrm>
-          <a:prstGeom prst="rect">
-            <a:avLst/>
-          </a:prstGeom>
-          <a:noFill/>
-        </p:spPr>
-        <p:txBody>
-          <a:bodyPr rot="0" spcFirstLastPara="0" vertOverflow="overflow" horzOverflow="overflow" vert="horz" wrap="square" lIns="91440" tIns="45720" rIns="91440" bIns="45720" numCol="1" spcCol="0" rtlCol="0" fromWordArt="0" anchor="t" anchorCtr="0" forceAA="0" compatLnSpc="1">
-            <a:prstTxWarp prst="textNoShape">
-              <a:avLst/>
-            </a:prstTxWarp>
-            <a:spAutoFit/>
-          </a:bodyPr>
-          <a:lstStyle/>
-          <a:p>
-            <a:r>
-              <a:rPr lang="pt-PT" dirty="0"/>
-              <a:t>Desenvolvedores:</a:t>
-            </a:r>
-          </a:p>
-        </p:txBody>
-      </p:sp>
-      <p:sp>
-        <p:nvSpPr>
-          <p:cNvPr id="8" name="CaixaDeTexto 7">
-            <a:extLst>
-              <a:ext uri="{FF2B5EF4-FFF2-40B4-BE49-F238E27FC236}">
-                <a16:creationId xmlns:a16="http://schemas.microsoft.com/office/drawing/2014/main" id="{AE7C3B73-5DAA-7494-72F5-DE452C907435}"/>
-              </a:ext>
-            </a:extLst>
-          </p:cNvPr>
-          <p:cNvSpPr txBox="1"/>
-          <p:nvPr/>
-        </p:nvSpPr>
-        <p:spPr>
-          <a:xfrm>
-            <a:off x="669471" y="2003707"/>
-            <a:ext cx="7819292" cy="5078313"/>
-          </a:xfrm>
-          <a:prstGeom prst="rect">
-            <a:avLst/>
-          </a:prstGeom>
-          <a:noFill/>
-        </p:spPr>
-        <p:txBody>
-          <a:bodyPr rot="0" spcFirstLastPara="0" vertOverflow="overflow" horzOverflow="overflow" vert="horz" wrap="square" lIns="91440" tIns="45720" rIns="91440" bIns="45720" numCol="1" spcCol="0" rtlCol="0" fromWordArt="0" anchor="t" anchorCtr="0" forceAA="0" compatLnSpc="1">
-            <a:prstTxWarp prst="textNoShape">
-              <a:avLst/>
-            </a:prstTxWarp>
-            <a:spAutoFit/>
-          </a:bodyPr>
-          <a:lstStyle/>
-          <a:p>
-            <a:r>
-              <a:rPr lang="pt-PT" dirty="0"/>
-              <a:t> Desenvolvedor 1:</a:t>
-            </a:r>
-          </a:p>
-          <a:p>
-            <a:endParaRPr lang="pt-PT" dirty="0"/>
-          </a:p>
-          <a:p>
-            <a:endParaRPr lang="pt-PT" dirty="0"/>
-          </a:p>
-          <a:p>
-            <a:endParaRPr lang="pt-PT" dirty="0"/>
-          </a:p>
-          <a:p>
-            <a:endParaRPr lang="pt-PT" dirty="0"/>
-          </a:p>
-          <a:p>
-            <a:endParaRPr lang="pt-PT" dirty="0"/>
-          </a:p>
-          <a:p>
-            <a:endParaRPr lang="pt-PT" dirty="0"/>
-          </a:p>
-          <a:p>
-            <a:endParaRPr lang="pt-PT" dirty="0"/>
-          </a:p>
-          <a:p>
-            <a:endParaRPr lang="pt-PT" dirty="0"/>
-          </a:p>
-          <a:p>
-            <a:endParaRPr lang="pt-PT" dirty="0"/>
-          </a:p>
-          <a:p>
-            <a:endParaRPr lang="pt-PT" dirty="0"/>
-          </a:p>
-          <a:p>
-            <a:r>
-              <a:rPr lang="pt-PT" dirty="0"/>
-              <a:t> Desenvolvedor 2:</a:t>
-            </a:r>
-          </a:p>
-          <a:p>
-            <a:endParaRPr lang="pt-PT" dirty="0"/>
-          </a:p>
-          <a:p>
-            <a:r>
-              <a:rPr lang="pt-PT" dirty="0"/>
-              <a:t> Desenvolvedor 3:</a:t>
-            </a:r>
-          </a:p>
-          <a:p>
-            <a:endParaRPr lang="pt-PT" dirty="0"/>
-          </a:p>
-          <a:p>
-            <a:r>
-              <a:rPr lang="pt-PT" dirty="0"/>
-              <a:t> Desenvolvedor 4:</a:t>
-            </a:r>
-          </a:p>
-          <a:p>
-            <a:endParaRPr lang="pt-PT" dirty="0"/>
-          </a:p>
-          <a:p>
-            <a:endParaRPr lang="pt-PT" dirty="0"/>
-          </a:p>
-        </p:txBody>
-      </p:sp>
-      <p:sp>
-        <p:nvSpPr>
-          <p:cNvPr id="5" name="CaixaDeTexto 4">
-            <a:extLst>
-              <a:ext uri="{FF2B5EF4-FFF2-40B4-BE49-F238E27FC236}">
-                <a16:creationId xmlns:a16="http://schemas.microsoft.com/office/drawing/2014/main" id="{AC60F33D-3A98-0DEB-6B67-5FB9A15E86DB}"/>
-              </a:ext>
-            </a:extLst>
-          </p:cNvPr>
-          <p:cNvSpPr txBox="1"/>
-          <p:nvPr/>
-        </p:nvSpPr>
-        <p:spPr>
-          <a:xfrm>
-            <a:off x="-3769" y="6490817"/>
-            <a:ext cx="12181115" cy="369332"/>
-          </a:xfrm>
-          <a:prstGeom prst="rect">
-            <a:avLst/>
-          </a:prstGeom>
-        </p:spPr>
-        <p:style>
-          <a:lnRef idx="2">
-            <a:schemeClr val="dk1"/>
-          </a:lnRef>
-          <a:fillRef idx="1">
-            <a:schemeClr val="lt1"/>
-          </a:fillRef>
-          <a:effectRef idx="0">
-            <a:schemeClr val="dk1"/>
-          </a:effectRef>
-          <a:fontRef idx="minor">
-            <a:schemeClr val="dk1"/>
-          </a:fontRef>
-        </p:style>
-        <p:txBody>
-          <a:bodyPr rot="0" spcFirstLastPara="0" vertOverflow="overflow" horzOverflow="overflow" vert="horz" wrap="square" lIns="91440" tIns="45720" rIns="91440" bIns="45720" numCol="1" spcCol="0" rtlCol="0" fromWordArt="0" anchor="t" anchorCtr="0" forceAA="0" compatLnSpc="1">
-            <a:prstTxWarp prst="textNoShape">
-              <a:avLst/>
-            </a:prstTxWarp>
-            <a:spAutoFit/>
-          </a:bodyPr>
-          <a:lstStyle/>
-          <a:p>
-            <a:pPr algn="ctr"/>
-            <a:r>
-              <a:rPr lang="pt-PT" dirty="0"/>
-              <a:t>Desenvolvedores</a:t>
-            </a:r>
-          </a:p>
-        </p:txBody>
-      </p:sp>
-      <p:pic>
-        <p:nvPicPr>
-          <p:cNvPr id="9" name="Imagem 8" descr="Profile Icon Vector Art, Icons, and Graphics for Free Download">
-            <a:extLst>
-              <a:ext uri="{FF2B5EF4-FFF2-40B4-BE49-F238E27FC236}">
-                <a16:creationId xmlns:a16="http://schemas.microsoft.com/office/drawing/2014/main" id="{F7ACA970-3872-30DF-41D9-477FACDA9BE9}"/>
-              </a:ext>
-            </a:extLst>
-          </p:cNvPr>
-          <p:cNvPicPr>
-            <a:picLocks noChangeAspect="1"/>
-          </p:cNvPicPr>
-          <p:nvPr/>
-        </p:nvPicPr>
-        <p:blipFill>
-          <a:blip r:embed="rId2"/>
-          <a:stretch>
-            <a:fillRect/>
-          </a:stretch>
-        </p:blipFill>
-        <p:spPr>
-          <a:xfrm>
-            <a:off x="1009459" y="2470749"/>
-            <a:ext cx="2231572" cy="2275115"/>
-          </a:xfrm>
-          <a:prstGeom prst="rect">
-            <a:avLst/>
-          </a:prstGeom>
-          <a:ln w="38100" cap="sq">
-            <a:solidFill>
-              <a:srgbClr val="000000"/>
-            </a:solidFill>
-            <a:prstDash val="solid"/>
-            <a:miter lim="800000"/>
-          </a:ln>
-          <a:effectLst>
-            <a:outerShdw blurRad="50800" dist="38100" dir="2700000" algn="tl" rotWithShape="0">
-              <a:srgbClr val="000000">
-                <a:alpha val="43000"/>
-              </a:srgbClr>
-            </a:outerShdw>
-          </a:effectLst>
-        </p:spPr>
-      </p:pic>
-      <p:sp>
-        <p:nvSpPr>
-          <p:cNvPr id="12" name="CaixaDeTexto 11">
-            <a:extLst>
-              <a:ext uri="{FF2B5EF4-FFF2-40B4-BE49-F238E27FC236}">
-                <a16:creationId xmlns:a16="http://schemas.microsoft.com/office/drawing/2014/main" id="{4811ECF1-33E7-F2D6-321E-AE69A2292431}"/>
-              </a:ext>
-            </a:extLst>
-          </p:cNvPr>
-          <p:cNvSpPr txBox="1"/>
-          <p:nvPr/>
-        </p:nvSpPr>
-        <p:spPr>
-          <a:xfrm>
-            <a:off x="4348843" y="2404485"/>
-            <a:ext cx="5870750" cy="1477328"/>
-          </a:xfrm>
-          <a:prstGeom prst="rect">
-            <a:avLst/>
-          </a:prstGeom>
-          <a:noFill/>
-        </p:spPr>
-        <p:txBody>
-          <a:bodyPr rot="0" spcFirstLastPara="0" vertOverflow="overflow" horzOverflow="overflow" vert="horz" wrap="square" lIns="91440" tIns="45720" rIns="91440" bIns="45720" numCol="1" spcCol="0" rtlCol="0" fromWordArt="0" anchor="t" anchorCtr="0" forceAA="0" compatLnSpc="1">
-            <a:prstTxWarp prst="textNoShape">
-              <a:avLst/>
-            </a:prstTxWarp>
-            <a:spAutoFit/>
-          </a:bodyPr>
-          <a:lstStyle/>
-          <a:p>
-            <a:r>
-              <a:rPr lang="pt-PT" dirty="0"/>
-              <a:t>E-mail: email@email.com</a:t>
-            </a:r>
-          </a:p>
-          <a:p>
-            <a:endParaRPr lang="pt-PT" dirty="0"/>
-          </a:p>
-          <a:p>
-            <a:r>
-              <a:rPr lang="pt-PT" dirty="0"/>
-              <a:t>Faculdade: FEUP</a:t>
-            </a:r>
-          </a:p>
-          <a:p>
-            <a:endParaRPr lang="pt-PT" dirty="0"/>
-          </a:p>
-          <a:p>
-            <a:r>
-              <a:rPr lang="pt-PT" dirty="0"/>
-              <a:t>Curso:  MEEC</a:t>
-            </a:r>
-          </a:p>
-        </p:txBody>
-      </p:sp>
-    </p:spTree>
-    <p:extLst>
-      <p:ext uri="{BB962C8B-B14F-4D97-AF65-F5344CB8AC3E}">
-        <p14:creationId xmlns:p14="http://schemas.microsoft.com/office/powerpoint/2010/main" val="2010659919"/>
       </p:ext>
     </p:extLst>
   </p:cSld>

</xml_diff>